<commit_message>
ENH: action exp finished
</commit_message>
<xml_diff>
--- a/action/instruction/instruction.pptx
+++ b/action/instruction/instruction.pptx
@@ -5,26 +5,19 @@
     <p:sldMasterId id="2147483660" r:id="rId1"/>
   </p:sldMasterIdLst>
   <p:notesMasterIdLst>
-    <p:notesMasterId r:id="rId19"/>
+    <p:notesMasterId r:id="rId12"/>
   </p:notesMasterIdLst>
   <p:sldIdLst>
     <p:sldId id="275" r:id="rId2"/>
     <p:sldId id="287" r:id="rId3"/>
-    <p:sldId id="276" r:id="rId4"/>
-    <p:sldId id="268" r:id="rId5"/>
-    <p:sldId id="283" r:id="rId6"/>
-    <p:sldId id="284" r:id="rId7"/>
-    <p:sldId id="286" r:id="rId8"/>
-    <p:sldId id="259" r:id="rId9"/>
-    <p:sldId id="278" r:id="rId10"/>
-    <p:sldId id="269" r:id="rId11"/>
-    <p:sldId id="282" r:id="rId12"/>
-    <p:sldId id="277" r:id="rId13"/>
-    <p:sldId id="274" r:id="rId14"/>
-    <p:sldId id="280" r:id="rId15"/>
-    <p:sldId id="288" r:id="rId16"/>
-    <p:sldId id="289" r:id="rId17"/>
-    <p:sldId id="290" r:id="rId18"/>
+    <p:sldId id="268" r:id="rId4"/>
+    <p:sldId id="283" r:id="rId5"/>
+    <p:sldId id="284" r:id="rId6"/>
+    <p:sldId id="286" r:id="rId7"/>
+    <p:sldId id="259" r:id="rId8"/>
+    <p:sldId id="288" r:id="rId9"/>
+    <p:sldId id="289" r:id="rId10"/>
+    <p:sldId id="290" r:id="rId11"/>
   </p:sldIdLst>
   <p:sldSz cx="9144000" cy="6858000" type="screen4x3"/>
   <p:notesSz cx="6858000" cy="9144000"/>
@@ -213,7 +206,7 @@
           <a:p>
             <a:fld id="{5E0BD2FF-DB0B-4157-9238-BCF205BF74EE}" type="datetimeFigureOut">
               <a:rPr lang="zh-CN" altLang="en-US" smtClean="0"/>
-              <a:t>2020/12/13</a:t>
+              <a:t>2021/1/21</a:t>
             </a:fld>
             <a:endParaRPr lang="zh-CN" altLang="en-US"/>
           </a:p>
@@ -553,7 +546,7 @@
           <a:p>
             <a:fld id="{877254A5-7E02-4BE6-9FDC-9A93DDC1686D}" type="slidenum">
               <a:rPr lang="zh-CN" altLang="en-US" smtClean="0"/>
-              <a:t>4</a:t>
+              <a:t>3</a:t>
             </a:fld>
             <a:endParaRPr lang="zh-CN" altLang="en-US"/>
           </a:p>
@@ -688,7 +681,7 @@
                 <a:tabLst/>
                 <a:defRPr/>
               </a:pPr>
-              <a:t>5</a:t>
+              <a:t>4</a:t>
             </a:fld>
             <a:endParaRPr kumimoji="0" lang="zh-CN" altLang="en-US" sz="1200" b="0" i="0" u="none" strike="noStrike" kern="1200" cap="none" spc="0" normalizeH="0" baseline="0" noProof="0">
               <a:ln>
@@ -788,7 +781,7 @@
           <a:p>
             <a:fld id="{877254A5-7E02-4BE6-9FDC-9A93DDC1686D}" type="slidenum">
               <a:rPr lang="zh-CN" altLang="en-US" smtClean="0"/>
-              <a:t>6</a:t>
+              <a:t>5</a:t>
             </a:fld>
             <a:endParaRPr lang="zh-CN" altLang="en-US"/>
           </a:p>
@@ -913,7 +906,7 @@
           <a:p>
             <a:fld id="{877254A5-7E02-4BE6-9FDC-9A93DDC1686D}" type="slidenum">
               <a:rPr lang="zh-CN" altLang="en-US" smtClean="0"/>
-              <a:t>8</a:t>
+              <a:t>7</a:t>
             </a:fld>
             <a:endParaRPr lang="zh-CN" altLang="en-US"/>
           </a:p>
@@ -923,250 +916,6 @@
     <p:extLst>
       <p:ext uri="{BB962C8B-B14F-4D97-AF65-F5344CB8AC3E}">
         <p14:creationId xmlns:p14="http://schemas.microsoft.com/office/powerpoint/2010/main" val="2463962801"/>
-      </p:ext>
-    </p:extLst>
-  </p:cSld>
-  <p:clrMapOvr>
-    <a:masterClrMapping/>
-  </p:clrMapOvr>
-</p:notes>
-</file>
-
-<file path=ppt/notesSlides/notesSlide5.xml><?xml version="1.0" encoding="utf-8"?>
-<p:notes xmlns:a="http://schemas.openxmlformats.org/drawingml/2006/main" xmlns:r="http://schemas.openxmlformats.org/officeDocument/2006/relationships" xmlns:p="http://schemas.openxmlformats.org/presentationml/2006/main">
-  <p:cSld>
-    <p:spTree>
-      <p:nvGrpSpPr>
-        <p:cNvPr id="1" name=""/>
-        <p:cNvGrpSpPr/>
-        <p:nvPr/>
-      </p:nvGrpSpPr>
-      <p:grpSpPr>
-        <a:xfrm>
-          <a:off x="0" y="0"/>
-          <a:ext cx="0" cy="0"/>
-          <a:chOff x="0" y="0"/>
-          <a:chExt cx="0" cy="0"/>
-        </a:xfrm>
-      </p:grpSpPr>
-      <p:sp>
-        <p:nvSpPr>
-          <p:cNvPr id="2" name="幻灯片图像占位符 1"/>
-          <p:cNvSpPr>
-            <a:spLocks noGrp="1" noRot="1" noChangeAspect="1"/>
-          </p:cNvSpPr>
-          <p:nvPr>
-            <p:ph type="sldImg"/>
-          </p:nvPr>
-        </p:nvSpPr>
-        <p:spPr/>
-      </p:sp>
-      <p:sp>
-        <p:nvSpPr>
-          <p:cNvPr id="3" name="备注占位符 2"/>
-          <p:cNvSpPr>
-            <a:spLocks noGrp="1"/>
-          </p:cNvSpPr>
-          <p:nvPr>
-            <p:ph type="body" idx="1"/>
-          </p:nvPr>
-        </p:nvSpPr>
-        <p:spPr/>
-        <p:txBody>
-          <a:bodyPr/>
-          <a:lstStyle/>
-          <a:p>
-            <a:r>
-              <a:rPr lang="en-US" altLang="zh-CN" dirty="0"/>
-              <a:t>BIN</a:t>
-            </a:r>
-            <a:r>
-              <a:rPr lang="en-US" altLang="zh-CN" baseline="0" dirty="0"/>
-              <a:t> test instructions</a:t>
-            </a:r>
-            <a:endParaRPr lang="zh-CN" altLang="en-US" dirty="0"/>
-          </a:p>
-        </p:txBody>
-      </p:sp>
-      <p:sp>
-        <p:nvSpPr>
-          <p:cNvPr id="4" name="灯片编号占位符 3"/>
-          <p:cNvSpPr>
-            <a:spLocks noGrp="1"/>
-          </p:cNvSpPr>
-          <p:nvPr>
-            <p:ph type="sldNum" sz="quarter" idx="10"/>
-          </p:nvPr>
-        </p:nvSpPr>
-        <p:spPr/>
-        <p:txBody>
-          <a:bodyPr/>
-          <a:lstStyle/>
-          <a:p>
-            <a:fld id="{877254A5-7E02-4BE6-9FDC-9A93DDC1686D}" type="slidenum">
-              <a:rPr lang="zh-CN" altLang="en-US" smtClean="0"/>
-              <a:t>10</a:t>
-            </a:fld>
-            <a:endParaRPr lang="zh-CN" altLang="en-US"/>
-          </a:p>
-        </p:txBody>
-      </p:sp>
-    </p:spTree>
-    <p:extLst>
-      <p:ext uri="{BB962C8B-B14F-4D97-AF65-F5344CB8AC3E}">
-        <p14:creationId xmlns:p14="http://schemas.microsoft.com/office/powerpoint/2010/main" val="1120127344"/>
-      </p:ext>
-    </p:extLst>
-  </p:cSld>
-  <p:clrMapOvr>
-    <a:masterClrMapping/>
-  </p:clrMapOvr>
-</p:notes>
-</file>
-
-<file path=ppt/notesSlides/notesSlide6.xml><?xml version="1.0" encoding="utf-8"?>
-<p:notes xmlns:a="http://schemas.openxmlformats.org/drawingml/2006/main" xmlns:r="http://schemas.openxmlformats.org/officeDocument/2006/relationships" xmlns:p="http://schemas.openxmlformats.org/presentationml/2006/main">
-  <p:cSld>
-    <p:spTree>
-      <p:nvGrpSpPr>
-        <p:cNvPr id="1" name=""/>
-        <p:cNvGrpSpPr/>
-        <p:nvPr/>
-      </p:nvGrpSpPr>
-      <p:grpSpPr>
-        <a:xfrm>
-          <a:off x="0" y="0"/>
-          <a:ext cx="0" cy="0"/>
-          <a:chOff x="0" y="0"/>
-          <a:chExt cx="0" cy="0"/>
-        </a:xfrm>
-      </p:grpSpPr>
-      <p:sp>
-        <p:nvSpPr>
-          <p:cNvPr id="2" name="幻灯片图像占位符 1"/>
-          <p:cNvSpPr>
-            <a:spLocks noGrp="1" noRot="1" noChangeAspect="1"/>
-          </p:cNvSpPr>
-          <p:nvPr>
-            <p:ph type="sldImg"/>
-          </p:nvPr>
-        </p:nvSpPr>
-        <p:spPr/>
-      </p:sp>
-      <p:sp>
-        <p:nvSpPr>
-          <p:cNvPr id="3" name="备注占位符 2"/>
-          <p:cNvSpPr>
-            <a:spLocks noGrp="1"/>
-          </p:cNvSpPr>
-          <p:nvPr>
-            <p:ph type="body" idx="1"/>
-          </p:nvPr>
-        </p:nvSpPr>
-        <p:spPr/>
-        <p:txBody>
-          <a:bodyPr/>
-          <a:lstStyle/>
-          <a:p>
-            <a:r>
-              <a:rPr lang="en-US" altLang="zh-CN" dirty="0"/>
-              <a:t>BIN</a:t>
-            </a:r>
-            <a:r>
-              <a:rPr lang="en-US" altLang="zh-CN" baseline="0" dirty="0"/>
-              <a:t> train instructions</a:t>
-            </a:r>
-            <a:endParaRPr lang="zh-CN" altLang="en-US" dirty="0"/>
-          </a:p>
-        </p:txBody>
-      </p:sp>
-      <p:sp>
-        <p:nvSpPr>
-          <p:cNvPr id="4" name="灯片编号占位符 3"/>
-          <p:cNvSpPr>
-            <a:spLocks noGrp="1"/>
-          </p:cNvSpPr>
-          <p:nvPr>
-            <p:ph type="sldNum" sz="quarter" idx="10"/>
-          </p:nvPr>
-        </p:nvSpPr>
-        <p:spPr/>
-        <p:txBody>
-          <a:bodyPr/>
-          <a:lstStyle/>
-          <a:p>
-            <a:pPr marL="0" marR="0" lvl="0" indent="0" algn="r" defTabSz="457200" rtl="0" eaLnBrk="1" fontAlgn="auto" latinLnBrk="0" hangingPunct="1">
-              <a:lnSpc>
-                <a:spcPct val="100000"/>
-              </a:lnSpc>
-              <a:spcBef>
-                <a:spcPts val="0"/>
-              </a:spcBef>
-              <a:spcAft>
-                <a:spcPts val="0"/>
-              </a:spcAft>
-              <a:buClrTx/>
-              <a:buSzTx/>
-              <a:buFontTx/>
-              <a:buNone/>
-              <a:tabLst/>
-              <a:defRPr/>
-            </a:pPr>
-            <a:fld id="{877254A5-7E02-4BE6-9FDC-9A93DDC1686D}" type="slidenum">
-              <a:rPr kumimoji="0" lang="zh-CN" altLang="en-US" sz="1200" b="0" i="0" u="none" strike="noStrike" kern="1200" cap="none" spc="0" normalizeH="0" baseline="0" noProof="0" smtClean="0">
-                <a:ln>
-                  <a:noFill/>
-                </a:ln>
-                <a:solidFill>
-                  <a:prstClr val="black"/>
-                </a:solidFill>
-                <a:effectLst/>
-                <a:uLnTx/>
-                <a:uFillTx/>
-                <a:latin typeface="等线" panose="020F0502020204030204"/>
-                <a:ea typeface="等线" panose="02010600030101010101" pitchFamily="2" charset="-122"/>
-                <a:cs typeface="+mn-cs"/>
-              </a:rPr>
-              <a:pPr marL="0" marR="0" lvl="0" indent="0" algn="r" defTabSz="457200" rtl="0" eaLnBrk="1" fontAlgn="auto" latinLnBrk="0" hangingPunct="1">
-                <a:lnSpc>
-                  <a:spcPct val="100000"/>
-                </a:lnSpc>
-                <a:spcBef>
-                  <a:spcPts val="0"/>
-                </a:spcBef>
-                <a:spcAft>
-                  <a:spcPts val="0"/>
-                </a:spcAft>
-                <a:buClrTx/>
-                <a:buSzTx/>
-                <a:buFontTx/>
-                <a:buNone/>
-                <a:tabLst/>
-                <a:defRPr/>
-              </a:pPr>
-              <a:t>13</a:t>
-            </a:fld>
-            <a:endParaRPr kumimoji="0" lang="zh-CN" altLang="en-US" sz="1200" b="0" i="0" u="none" strike="noStrike" kern="1200" cap="none" spc="0" normalizeH="0" baseline="0" noProof="0">
-              <a:ln>
-                <a:noFill/>
-              </a:ln>
-              <a:solidFill>
-                <a:prstClr val="black"/>
-              </a:solidFill>
-              <a:effectLst/>
-              <a:uLnTx/>
-              <a:uFillTx/>
-              <a:latin typeface="等线" panose="020F0502020204030204"/>
-              <a:ea typeface="等线" panose="02010600030101010101" pitchFamily="2" charset="-122"/>
-              <a:cs typeface="+mn-cs"/>
-            </a:endParaRPr>
-          </a:p>
-        </p:txBody>
-      </p:sp>
-    </p:spTree>
-    <p:extLst>
-      <p:ext uri="{BB962C8B-B14F-4D97-AF65-F5344CB8AC3E}">
-        <p14:creationId xmlns:p14="http://schemas.microsoft.com/office/powerpoint/2010/main" val="1210468349"/>
       </p:ext>
     </p:extLst>
   </p:cSld>
@@ -1307,7 +1056,7 @@
           <a:p>
             <a:fld id="{C56612D5-36F0-430E-8993-22E7E4C9B704}" type="datetimeFigureOut">
               <a:rPr lang="zh-CN" altLang="en-US" smtClean="0"/>
-              <a:t>2020/12/13</a:t>
+              <a:t>2021/1/21</a:t>
             </a:fld>
             <a:endParaRPr lang="zh-CN" altLang="en-US"/>
           </a:p>
@@ -1477,7 +1226,7 @@
           <a:p>
             <a:fld id="{C56612D5-36F0-430E-8993-22E7E4C9B704}" type="datetimeFigureOut">
               <a:rPr lang="zh-CN" altLang="en-US" smtClean="0"/>
-              <a:t>2020/12/13</a:t>
+              <a:t>2021/1/21</a:t>
             </a:fld>
             <a:endParaRPr lang="zh-CN" altLang="en-US"/>
           </a:p>
@@ -1657,7 +1406,7 @@
           <a:p>
             <a:fld id="{C56612D5-36F0-430E-8993-22E7E4C9B704}" type="datetimeFigureOut">
               <a:rPr lang="zh-CN" altLang="en-US" smtClean="0"/>
-              <a:t>2020/12/13</a:t>
+              <a:t>2021/1/21</a:t>
             </a:fld>
             <a:endParaRPr lang="zh-CN" altLang="en-US"/>
           </a:p>
@@ -1827,7 +1576,7 @@
           <a:p>
             <a:fld id="{C56612D5-36F0-430E-8993-22E7E4C9B704}" type="datetimeFigureOut">
               <a:rPr lang="zh-CN" altLang="en-US" smtClean="0"/>
-              <a:t>2020/12/13</a:t>
+              <a:t>2021/1/21</a:t>
             </a:fld>
             <a:endParaRPr lang="zh-CN" altLang="en-US"/>
           </a:p>
@@ -2071,7 +1820,7 @@
           <a:p>
             <a:fld id="{C56612D5-36F0-430E-8993-22E7E4C9B704}" type="datetimeFigureOut">
               <a:rPr lang="zh-CN" altLang="en-US" smtClean="0"/>
-              <a:t>2020/12/13</a:t>
+              <a:t>2021/1/21</a:t>
             </a:fld>
             <a:endParaRPr lang="zh-CN" altLang="en-US"/>
           </a:p>
@@ -2303,7 +2052,7 @@
           <a:p>
             <a:fld id="{C56612D5-36F0-430E-8993-22E7E4C9B704}" type="datetimeFigureOut">
               <a:rPr lang="zh-CN" altLang="en-US" smtClean="0"/>
-              <a:t>2020/12/13</a:t>
+              <a:t>2021/1/21</a:t>
             </a:fld>
             <a:endParaRPr lang="zh-CN" altLang="en-US"/>
           </a:p>
@@ -2670,7 +2419,7 @@
           <a:p>
             <a:fld id="{C56612D5-36F0-430E-8993-22E7E4C9B704}" type="datetimeFigureOut">
               <a:rPr lang="zh-CN" altLang="en-US" smtClean="0"/>
-              <a:t>2020/12/13</a:t>
+              <a:t>2021/1/21</a:t>
             </a:fld>
             <a:endParaRPr lang="zh-CN" altLang="en-US"/>
           </a:p>
@@ -2788,7 +2537,7 @@
           <a:p>
             <a:fld id="{C56612D5-36F0-430E-8993-22E7E4C9B704}" type="datetimeFigureOut">
               <a:rPr lang="zh-CN" altLang="en-US" smtClean="0"/>
-              <a:t>2020/12/13</a:t>
+              <a:t>2021/1/21</a:t>
             </a:fld>
             <a:endParaRPr lang="zh-CN" altLang="en-US"/>
           </a:p>
@@ -2883,7 +2632,7 @@
           <a:p>
             <a:fld id="{C56612D5-36F0-430E-8993-22E7E4C9B704}" type="datetimeFigureOut">
               <a:rPr lang="zh-CN" altLang="en-US" smtClean="0"/>
-              <a:t>2020/12/13</a:t>
+              <a:t>2021/1/21</a:t>
             </a:fld>
             <a:endParaRPr lang="zh-CN" altLang="en-US"/>
           </a:p>
@@ -3160,7 +2909,7 @@
           <a:p>
             <a:fld id="{C56612D5-36F0-430E-8993-22E7E4C9B704}" type="datetimeFigureOut">
               <a:rPr lang="zh-CN" altLang="en-US" smtClean="0"/>
-              <a:t>2020/12/13</a:t>
+              <a:t>2021/1/21</a:t>
             </a:fld>
             <a:endParaRPr lang="zh-CN" altLang="en-US"/>
           </a:p>
@@ -3417,7 +3166,7 @@
           <a:p>
             <a:fld id="{C56612D5-36F0-430E-8993-22E7E4C9B704}" type="datetimeFigureOut">
               <a:rPr lang="zh-CN" altLang="en-US" smtClean="0"/>
-              <a:t>2020/12/13</a:t>
+              <a:t>2021/1/21</a:t>
             </a:fld>
             <a:endParaRPr lang="zh-CN" altLang="en-US"/>
           </a:p>
@@ -3630,7 +3379,7 @@
           <a:p>
             <a:fld id="{C56612D5-36F0-430E-8993-22E7E4C9B704}" type="datetimeFigureOut">
               <a:rPr lang="zh-CN" altLang="en-US" smtClean="0"/>
-              <a:t>2020/12/13</a:t>
+              <a:t>2021/1/21</a:t>
             </a:fld>
             <a:endParaRPr lang="zh-CN" altLang="en-US"/>
           </a:p>
@@ -4056,7 +3805,7 @@
                 <a:ea typeface="黑体" panose="02010609060101010101" pitchFamily="49" charset="-122"/>
                 <a:cs typeface="Times New Roman" panose="02020603050405020304" pitchFamily="18" charset="0"/>
               </a:rPr>
-              <a:t>BIN </a:t>
+              <a:t>action </a:t>
             </a:r>
             <a:r>
               <a:rPr lang="zh-CN" altLang="en-US" dirty="0">
@@ -4107,815 +3856,7 @@
     <p:bg>
       <p:bgPr>
         <a:solidFill>
-          <a:srgbClr val="7C7468"/>
-        </a:solidFill>
-        <a:effectLst/>
-      </p:bgPr>
-    </p:bg>
-    <p:spTree>
-      <p:nvGrpSpPr>
-        <p:cNvPr id="1" name=""/>
-        <p:cNvGrpSpPr/>
-        <p:nvPr/>
-      </p:nvGrpSpPr>
-      <p:grpSpPr>
-        <a:xfrm>
-          <a:off x="0" y="0"/>
-          <a:ext cx="0" cy="0"/>
-          <a:chOff x="0" y="0"/>
-          <a:chExt cx="0" cy="0"/>
-        </a:xfrm>
-      </p:grpSpPr>
-      <p:sp>
-        <p:nvSpPr>
-          <p:cNvPr id="3" name="副标题 2">
-            <a:extLst>
-              <a:ext uri="{FF2B5EF4-FFF2-40B4-BE49-F238E27FC236}">
-                <a16:creationId xmlns:a16="http://schemas.microsoft.com/office/drawing/2014/main" id="{B0A449E8-B1BB-440E-8CB2-BC01D38DC01D}"/>
-              </a:ext>
-            </a:extLst>
-          </p:cNvPr>
-          <p:cNvSpPr>
-            <a:spLocks noGrp="1"/>
-          </p:cNvSpPr>
-          <p:nvPr>
-            <p:ph type="subTitle" idx="1"/>
-          </p:nvPr>
-        </p:nvSpPr>
-        <p:spPr>
-          <a:xfrm>
-            <a:off x="1592768" y="2504974"/>
-            <a:ext cx="5958464" cy="1848052"/>
-          </a:xfrm>
-        </p:spPr>
-        <p:txBody>
-          <a:bodyPr>
-            <a:noAutofit/>
-          </a:bodyPr>
-          <a:lstStyle/>
-          <a:p>
-            <a:pPr>
-              <a:lnSpc>
-                <a:spcPct val="120000"/>
-              </a:lnSpc>
-            </a:pPr>
-            <a:r>
-              <a:rPr lang="zh-CN" altLang="en-US" sz="2800" dirty="0">
-                <a:solidFill>
-                  <a:schemeClr val="bg1"/>
-                </a:solidFill>
-                <a:latin typeface="黑体" panose="02010609060101010101" pitchFamily="49" charset="-122"/>
-                <a:ea typeface="黑体" panose="02010609060101010101" pitchFamily="49" charset="-122"/>
-                <a:cs typeface="Times New Roman" panose="02020603050405020304" pitchFamily="18" charset="0"/>
-              </a:rPr>
-              <a:t>实验中请时刻注视屏幕中央的圆点，并在圆点颜色改变时尽快按左键反应。</a:t>
-            </a:r>
-            <a:endParaRPr lang="en-US" altLang="zh-CN" sz="2800" dirty="0">
-              <a:solidFill>
-                <a:schemeClr val="bg1"/>
-              </a:solidFill>
-              <a:latin typeface="黑体" panose="02010609060101010101" pitchFamily="49" charset="-122"/>
-              <a:ea typeface="黑体" panose="02010609060101010101" pitchFamily="49" charset="-122"/>
-              <a:cs typeface="Times New Roman" panose="02020603050405020304" pitchFamily="18" charset="0"/>
-            </a:endParaRPr>
-          </a:p>
-          <a:p>
-            <a:pPr>
-              <a:lnSpc>
-                <a:spcPct val="120000"/>
-              </a:lnSpc>
-            </a:pPr>
-            <a:r>
-              <a:rPr lang="zh-CN" altLang="en-US" sz="2800" dirty="0">
-                <a:solidFill>
-                  <a:prstClr val="white"/>
-                </a:solidFill>
-                <a:latin typeface="黑体" panose="02010609060101010101" pitchFamily="49" charset="-122"/>
-                <a:ea typeface="黑体" panose="02010609060101010101" pitchFamily="49" charset="-122"/>
-              </a:rPr>
-              <a:t>准备好后按左键开始实验。</a:t>
-            </a:r>
-            <a:endParaRPr kumimoji="0" lang="zh-CN" altLang="en-US" sz="3200" b="0" i="0" u="none" strike="noStrike" kern="1200" cap="none" spc="0" normalizeH="0" baseline="0" noProof="0" dirty="0">
-              <a:ln>
-                <a:noFill/>
-              </a:ln>
-              <a:solidFill>
-                <a:prstClr val="white"/>
-              </a:solidFill>
-              <a:effectLst/>
-              <a:uLnTx/>
-              <a:uFillTx/>
-              <a:latin typeface="黑体" panose="02010609060101010101" pitchFamily="49" charset="-122"/>
-              <a:ea typeface="黑体" panose="02010609060101010101" pitchFamily="49" charset="-122"/>
-              <a:cs typeface="+mj-cs"/>
-            </a:endParaRPr>
-          </a:p>
-        </p:txBody>
-      </p:sp>
-    </p:spTree>
-    <p:extLst>
-      <p:ext uri="{BB962C8B-B14F-4D97-AF65-F5344CB8AC3E}">
-        <p14:creationId xmlns:p14="http://schemas.microsoft.com/office/powerpoint/2010/main" val="2108798929"/>
-      </p:ext>
-    </p:extLst>
-  </p:cSld>
-  <p:clrMapOvr>
-    <a:masterClrMapping/>
-  </p:clrMapOvr>
-</p:sld>
-</file>
-
-<file path=ppt/slides/slide11.xml><?xml version="1.0" encoding="utf-8"?>
-<p:sld xmlns:a="http://schemas.openxmlformats.org/drawingml/2006/main" xmlns:r="http://schemas.openxmlformats.org/officeDocument/2006/relationships" xmlns:p="http://schemas.openxmlformats.org/presentationml/2006/main">
-  <p:cSld>
-    <p:bg>
-      <p:bgPr>
-        <a:solidFill>
-          <a:srgbClr val="7C7468"/>
-        </a:solidFill>
-        <a:effectLst/>
-      </p:bgPr>
-    </p:bg>
-    <p:spTree>
-      <p:nvGrpSpPr>
-        <p:cNvPr id="1" name=""/>
-        <p:cNvGrpSpPr/>
-        <p:nvPr/>
-      </p:nvGrpSpPr>
-      <p:grpSpPr>
-        <a:xfrm>
-          <a:off x="0" y="0"/>
-          <a:ext cx="0" cy="0"/>
-          <a:chOff x="0" y="0"/>
-          <a:chExt cx="0" cy="0"/>
-        </a:xfrm>
-      </p:grpSpPr>
-      <p:sp>
-        <p:nvSpPr>
-          <p:cNvPr id="5" name="标题 1">
-            <a:extLst>
-              <a:ext uri="{FF2B5EF4-FFF2-40B4-BE49-F238E27FC236}">
-                <a16:creationId xmlns:a16="http://schemas.microsoft.com/office/drawing/2014/main" id="{9E7F9276-CB36-4D03-8899-4441C9E51EC0}"/>
-              </a:ext>
-            </a:extLst>
-          </p:cNvPr>
-          <p:cNvSpPr txBox="1">
-            <a:spLocks/>
-          </p:cNvSpPr>
-          <p:nvPr/>
-        </p:nvSpPr>
-        <p:spPr>
-          <a:xfrm>
-            <a:off x="886353" y="3062696"/>
-            <a:ext cx="7371295" cy="732608"/>
-          </a:xfrm>
-          <a:prstGeom prst="rect">
-            <a:avLst/>
-          </a:prstGeom>
-        </p:spPr>
-        <p:txBody>
-          <a:bodyPr vert="horz" lIns="68580" tIns="34290" rIns="68580" bIns="34290" rtlCol="0" anchor="b">
-            <a:noAutofit/>
-          </a:bodyPr>
-          <a:lstStyle>
-            <a:lvl1pPr algn="ctr" defTabSz="914400" rtl="0" eaLnBrk="1" latinLnBrk="0" hangingPunct="1">
-              <a:lnSpc>
-                <a:spcPct val="90000"/>
-              </a:lnSpc>
-              <a:spcBef>
-                <a:spcPct val="0"/>
-              </a:spcBef>
-              <a:buNone/>
-              <a:defRPr sz="6000" kern="1200">
-                <a:solidFill>
-                  <a:schemeClr val="tx1"/>
-                </a:solidFill>
-                <a:latin typeface="+mj-lt"/>
-                <a:ea typeface="+mj-ea"/>
-                <a:cs typeface="+mj-cs"/>
-              </a:defRPr>
-            </a:lvl1pPr>
-          </a:lstStyle>
-          <a:p>
-            <a:pPr marL="0" marR="0" lvl="0" indent="0" algn="ctr" defTabSz="914400" rtl="0" eaLnBrk="1" fontAlgn="auto" latinLnBrk="0" hangingPunct="1">
-              <a:lnSpc>
-                <a:spcPct val="90000"/>
-              </a:lnSpc>
-              <a:spcBef>
-                <a:spcPct val="0"/>
-              </a:spcBef>
-              <a:spcAft>
-                <a:spcPts val="0"/>
-              </a:spcAft>
-              <a:buClrTx/>
-              <a:buSzTx/>
-              <a:buFontTx/>
-              <a:buNone/>
-              <a:tabLst/>
-              <a:defRPr/>
-            </a:pPr>
-            <a:r>
-              <a:rPr kumimoji="0" lang="zh-CN" altLang="en-US" sz="4000" b="0" i="0" u="none" strike="noStrike" kern="1200" cap="none" spc="0" normalizeH="0" baseline="0" noProof="0" dirty="0">
-                <a:ln>
-                  <a:noFill/>
-                </a:ln>
-                <a:solidFill>
-                  <a:prstClr val="white"/>
-                </a:solidFill>
-                <a:effectLst/>
-                <a:uLnTx/>
-                <a:uFillTx/>
-                <a:latin typeface="黑体" panose="02010609060101010101" pitchFamily="49" charset="-122"/>
-                <a:ea typeface="黑体" panose="02010609060101010101" pitchFamily="49" charset="-122"/>
-                <a:cs typeface="Times New Roman" panose="02020603050405020304" pitchFamily="18" charset="0"/>
-              </a:rPr>
-              <a:t>请稍事休息，后续实验马上开始。</a:t>
-            </a:r>
-            <a:endParaRPr kumimoji="0" lang="zh-CN" altLang="en-US" sz="4000" b="0" i="0" u="none" strike="noStrike" kern="1200" cap="none" spc="0" normalizeH="0" baseline="0" noProof="0" dirty="0">
-              <a:ln>
-                <a:noFill/>
-              </a:ln>
-              <a:solidFill>
-                <a:prstClr val="white"/>
-              </a:solidFill>
-              <a:effectLst/>
-              <a:uLnTx/>
-              <a:uFillTx/>
-              <a:latin typeface="黑体" panose="02010609060101010101" pitchFamily="49" charset="-122"/>
-              <a:ea typeface="黑体" panose="02010609060101010101" pitchFamily="49" charset="-122"/>
-              <a:cs typeface="+mj-cs"/>
-            </a:endParaRPr>
-          </a:p>
-        </p:txBody>
-      </p:sp>
-    </p:spTree>
-    <p:extLst>
-      <p:ext uri="{BB962C8B-B14F-4D97-AF65-F5344CB8AC3E}">
-        <p14:creationId xmlns:p14="http://schemas.microsoft.com/office/powerpoint/2010/main" val="155193632"/>
-      </p:ext>
-    </p:extLst>
-  </p:cSld>
-  <p:clrMapOvr>
-    <a:masterClrMapping/>
-  </p:clrMapOvr>
-</p:sld>
-</file>
-
-<file path=ppt/slides/slide12.xml><?xml version="1.0" encoding="utf-8"?>
-<p:sld xmlns:a="http://schemas.openxmlformats.org/drawingml/2006/main" xmlns:r="http://schemas.openxmlformats.org/officeDocument/2006/relationships" xmlns:p="http://schemas.openxmlformats.org/presentationml/2006/main">
-  <p:cSld>
-    <p:spTree>
-      <p:nvGrpSpPr>
-        <p:cNvPr id="1" name=""/>
-        <p:cNvGrpSpPr/>
-        <p:nvPr/>
-      </p:nvGrpSpPr>
-      <p:grpSpPr>
-        <a:xfrm>
-          <a:off x="0" y="0"/>
-          <a:ext cx="0" cy="0"/>
-          <a:chOff x="0" y="0"/>
-          <a:chExt cx="0" cy="0"/>
-        </a:xfrm>
-      </p:grpSpPr>
-      <p:sp>
-        <p:nvSpPr>
-          <p:cNvPr id="2" name="标题 1"/>
-          <p:cNvSpPr>
-            <a:spLocks noGrp="1"/>
-          </p:cNvSpPr>
-          <p:nvPr>
-            <p:ph type="title"/>
-          </p:nvPr>
-        </p:nvSpPr>
-        <p:spPr>
-          <a:xfrm>
-            <a:off x="628650" y="2766219"/>
-            <a:ext cx="7886700" cy="1325563"/>
-          </a:xfrm>
-        </p:spPr>
-        <p:txBody>
-          <a:bodyPr/>
-          <a:lstStyle/>
-          <a:p>
-            <a:pPr algn="ctr"/>
-            <a:r>
-              <a:rPr lang="en-US" altLang="zh-CN" dirty="0">
-                <a:latin typeface="Times New Roman" panose="02020603050405020304" pitchFamily="18" charset="0"/>
-                <a:cs typeface="Times New Roman" panose="02020603050405020304" pitchFamily="18" charset="0"/>
-              </a:rPr>
-              <a:t>Behavior</a:t>
-            </a:r>
-            <a:endParaRPr lang="zh-CN" altLang="en-US" dirty="0">
-              <a:latin typeface="Times New Roman" panose="02020603050405020304" pitchFamily="18" charset="0"/>
-              <a:cs typeface="Times New Roman" panose="02020603050405020304" pitchFamily="18" charset="0"/>
-            </a:endParaRPr>
-          </a:p>
-        </p:txBody>
-      </p:sp>
-    </p:spTree>
-    <p:extLst>
-      <p:ext uri="{BB962C8B-B14F-4D97-AF65-F5344CB8AC3E}">
-        <p14:creationId xmlns:p14="http://schemas.microsoft.com/office/powerpoint/2010/main" val="2884176794"/>
-      </p:ext>
-    </p:extLst>
-  </p:cSld>
-  <p:clrMapOvr>
-    <a:masterClrMapping/>
-  </p:clrMapOvr>
-</p:sld>
-</file>
-
-<file path=ppt/slides/slide13.xml><?xml version="1.0" encoding="utf-8"?>
-<p:sld xmlns:a="http://schemas.openxmlformats.org/drawingml/2006/main" xmlns:r="http://schemas.openxmlformats.org/officeDocument/2006/relationships" xmlns:p="http://schemas.openxmlformats.org/presentationml/2006/main">
-  <p:cSld>
-    <p:bg>
-      <p:bgPr>
-        <a:solidFill>
-          <a:srgbClr val="7C7468"/>
-        </a:solidFill>
-        <a:effectLst/>
-      </p:bgPr>
-    </p:bg>
-    <p:spTree>
-      <p:nvGrpSpPr>
-        <p:cNvPr id="1" name=""/>
-        <p:cNvGrpSpPr/>
-        <p:nvPr/>
-      </p:nvGrpSpPr>
-      <p:grpSpPr>
-        <a:xfrm>
-          <a:off x="0" y="0"/>
-          <a:ext cx="0" cy="0"/>
-          <a:chOff x="0" y="0"/>
-          <a:chExt cx="0" cy="0"/>
-        </a:xfrm>
-      </p:grpSpPr>
-      <p:sp>
-        <p:nvSpPr>
-          <p:cNvPr id="3" name="副标题 2">
-            <a:extLst>
-              <a:ext uri="{FF2B5EF4-FFF2-40B4-BE49-F238E27FC236}">
-                <a16:creationId xmlns:a16="http://schemas.microsoft.com/office/drawing/2014/main" id="{B0A449E8-B1BB-440E-8CB2-BC01D38DC01D}"/>
-              </a:ext>
-            </a:extLst>
-          </p:cNvPr>
-          <p:cNvSpPr>
-            <a:spLocks noGrp="1"/>
-          </p:cNvSpPr>
-          <p:nvPr>
-            <p:ph type="subTitle" idx="1"/>
-          </p:nvPr>
-        </p:nvSpPr>
-        <p:spPr>
-          <a:xfrm>
-            <a:off x="1651142" y="2278886"/>
-            <a:ext cx="5841717" cy="2300228"/>
-          </a:xfrm>
-        </p:spPr>
-        <p:txBody>
-          <a:bodyPr>
-            <a:noAutofit/>
-          </a:bodyPr>
-          <a:lstStyle/>
-          <a:p>
-            <a:pPr>
-              <a:lnSpc>
-                <a:spcPct val="120000"/>
-              </a:lnSpc>
-            </a:pPr>
-            <a:r>
-              <a:rPr lang="zh-CN" altLang="en-US" sz="2800" dirty="0">
-                <a:solidFill>
-                  <a:schemeClr val="bg1"/>
-                </a:solidFill>
-                <a:latin typeface="黑体" panose="02010609060101010101" pitchFamily="49" charset="-122"/>
-                <a:ea typeface="黑体" panose="02010609060101010101" pitchFamily="49" charset="-122"/>
-                <a:cs typeface="Times New Roman" panose="02020603050405020304" pitchFamily="18" charset="0"/>
-              </a:rPr>
-              <a:t>请判断每张图片是否在今天的磁共振实验中出现过，并尽快按键反应。出现过按左键，未出现过按右键。</a:t>
-            </a:r>
-            <a:endParaRPr lang="en-US" altLang="zh-CN" sz="2800" dirty="0">
-              <a:solidFill>
-                <a:schemeClr val="bg1"/>
-              </a:solidFill>
-              <a:latin typeface="黑体" panose="02010609060101010101" pitchFamily="49" charset="-122"/>
-              <a:ea typeface="黑体" panose="02010609060101010101" pitchFamily="49" charset="-122"/>
-              <a:cs typeface="Times New Roman" panose="02020603050405020304" pitchFamily="18" charset="0"/>
-            </a:endParaRPr>
-          </a:p>
-          <a:p>
-            <a:pPr>
-              <a:lnSpc>
-                <a:spcPct val="120000"/>
-              </a:lnSpc>
-            </a:pPr>
-            <a:r>
-              <a:rPr lang="zh-CN" altLang="en-US" sz="2800" dirty="0">
-                <a:solidFill>
-                  <a:schemeClr val="bg1"/>
-                </a:solidFill>
-                <a:latin typeface="黑体" panose="02010609060101010101" pitchFamily="49" charset="-122"/>
-                <a:ea typeface="黑体" panose="02010609060101010101" pitchFamily="49" charset="-122"/>
-              </a:rPr>
-              <a:t>准备好后按左键开始实验。</a:t>
-            </a:r>
-            <a:endParaRPr lang="en-US" altLang="zh-CN" sz="2800" b="1" dirty="0">
-              <a:solidFill>
-                <a:schemeClr val="bg1"/>
-              </a:solidFill>
-              <a:latin typeface="黑体" panose="02010609060101010101" pitchFamily="49" charset="-122"/>
-              <a:ea typeface="黑体" panose="02010609060101010101" pitchFamily="49" charset="-122"/>
-              <a:cs typeface="Times New Roman" panose="02020603050405020304" pitchFamily="18" charset="0"/>
-            </a:endParaRPr>
-          </a:p>
-        </p:txBody>
-      </p:sp>
-    </p:spTree>
-    <p:extLst>
-      <p:ext uri="{BB962C8B-B14F-4D97-AF65-F5344CB8AC3E}">
-        <p14:creationId xmlns:p14="http://schemas.microsoft.com/office/powerpoint/2010/main" val="3439886049"/>
-      </p:ext>
-    </p:extLst>
-  </p:cSld>
-  <p:clrMapOvr>
-    <a:masterClrMapping/>
-  </p:clrMapOvr>
-</p:sld>
-</file>
-
-<file path=ppt/slides/slide14.xml><?xml version="1.0" encoding="utf-8"?>
-<p:sld xmlns:a="http://schemas.openxmlformats.org/drawingml/2006/main" xmlns:r="http://schemas.openxmlformats.org/officeDocument/2006/relationships" xmlns:p="http://schemas.openxmlformats.org/presentationml/2006/main">
-  <p:cSld>
-    <p:bg>
-      <p:bgPr>
-        <a:solidFill>
-          <a:srgbClr val="7C7468"/>
-        </a:solidFill>
-        <a:effectLst/>
-      </p:bgPr>
-    </p:bg>
-    <p:spTree>
-      <p:nvGrpSpPr>
-        <p:cNvPr id="1" name=""/>
-        <p:cNvGrpSpPr/>
-        <p:nvPr/>
-      </p:nvGrpSpPr>
-      <p:grpSpPr>
-        <a:xfrm>
-          <a:off x="0" y="0"/>
-          <a:ext cx="0" cy="0"/>
-          <a:chOff x="0" y="0"/>
-          <a:chExt cx="0" cy="0"/>
-        </a:xfrm>
-      </p:grpSpPr>
-      <p:sp>
-        <p:nvSpPr>
-          <p:cNvPr id="5" name="标题 1">
-            <a:extLst>
-              <a:ext uri="{FF2B5EF4-FFF2-40B4-BE49-F238E27FC236}">
-                <a16:creationId xmlns:a16="http://schemas.microsoft.com/office/drawing/2014/main" id="{9E7F9276-CB36-4D03-8899-4441C9E51EC0}"/>
-              </a:ext>
-            </a:extLst>
-          </p:cNvPr>
-          <p:cNvSpPr txBox="1">
-            <a:spLocks/>
-          </p:cNvSpPr>
-          <p:nvPr/>
-        </p:nvSpPr>
-        <p:spPr>
-          <a:xfrm>
-            <a:off x="886353" y="3062696"/>
-            <a:ext cx="7371295" cy="732608"/>
-          </a:xfrm>
-          <a:prstGeom prst="rect">
-            <a:avLst/>
-          </a:prstGeom>
-        </p:spPr>
-        <p:txBody>
-          <a:bodyPr vert="horz" lIns="68580" tIns="34290" rIns="68580" bIns="34290" rtlCol="0" anchor="b">
-            <a:noAutofit/>
-          </a:bodyPr>
-          <a:lstStyle>
-            <a:lvl1pPr algn="ctr" defTabSz="914400" rtl="0" eaLnBrk="1" latinLnBrk="0" hangingPunct="1">
-              <a:lnSpc>
-                <a:spcPct val="90000"/>
-              </a:lnSpc>
-              <a:spcBef>
-                <a:spcPct val="0"/>
-              </a:spcBef>
-              <a:buNone/>
-              <a:defRPr sz="6000" kern="1200">
-                <a:solidFill>
-                  <a:schemeClr val="tx1"/>
-                </a:solidFill>
-                <a:latin typeface="+mj-lt"/>
-                <a:ea typeface="+mj-ea"/>
-                <a:cs typeface="+mj-cs"/>
-              </a:defRPr>
-            </a:lvl1pPr>
-          </a:lstStyle>
-          <a:p>
-            <a:pPr marL="0" marR="0" lvl="0" indent="0" algn="ctr" defTabSz="914400" rtl="0" eaLnBrk="1" fontAlgn="auto" latinLnBrk="0" hangingPunct="1">
-              <a:lnSpc>
-                <a:spcPct val="90000"/>
-              </a:lnSpc>
-              <a:spcBef>
-                <a:spcPct val="0"/>
-              </a:spcBef>
-              <a:spcAft>
-                <a:spcPts val="0"/>
-              </a:spcAft>
-              <a:buClrTx/>
-              <a:buSzTx/>
-              <a:buFontTx/>
-              <a:buNone/>
-              <a:tabLst/>
-              <a:defRPr/>
-            </a:pPr>
-            <a:r>
-              <a:rPr kumimoji="0" lang="zh-CN" altLang="en-US" sz="4000" b="0" i="0" u="none" strike="noStrike" kern="1200" cap="none" spc="0" normalizeH="0" baseline="0" noProof="0" dirty="0">
-                <a:ln>
-                  <a:noFill/>
-                </a:ln>
-                <a:solidFill>
-                  <a:prstClr val="white"/>
-                </a:solidFill>
-                <a:effectLst/>
-                <a:uLnTx/>
-                <a:uFillTx/>
-                <a:latin typeface="黑体" panose="02010609060101010101" pitchFamily="49" charset="-122"/>
-                <a:ea typeface="黑体" panose="02010609060101010101" pitchFamily="49" charset="-122"/>
-                <a:cs typeface="Times New Roman" panose="02020603050405020304" pitchFamily="18" charset="0"/>
-              </a:rPr>
-              <a:t>请稍事休息，后续实验马上开始。</a:t>
-            </a:r>
-            <a:endParaRPr kumimoji="0" lang="zh-CN" altLang="en-US" sz="4000" b="0" i="0" u="none" strike="noStrike" kern="1200" cap="none" spc="0" normalizeH="0" baseline="0" noProof="0" dirty="0">
-              <a:ln>
-                <a:noFill/>
-              </a:ln>
-              <a:solidFill>
-                <a:prstClr val="white"/>
-              </a:solidFill>
-              <a:effectLst/>
-              <a:uLnTx/>
-              <a:uFillTx/>
-              <a:latin typeface="黑体" panose="02010609060101010101" pitchFamily="49" charset="-122"/>
-              <a:ea typeface="黑体" panose="02010609060101010101" pitchFamily="49" charset="-122"/>
-              <a:cs typeface="+mj-cs"/>
-            </a:endParaRPr>
-          </a:p>
-        </p:txBody>
-      </p:sp>
-    </p:spTree>
-    <p:extLst>
-      <p:ext uri="{BB962C8B-B14F-4D97-AF65-F5344CB8AC3E}">
-        <p14:creationId xmlns:p14="http://schemas.microsoft.com/office/powerpoint/2010/main" val="1228723664"/>
-      </p:ext>
-    </p:extLst>
-  </p:cSld>
-  <p:clrMapOvr>
-    <a:masterClrMapping/>
-  </p:clrMapOvr>
-</p:sld>
-</file>
-
-<file path=ppt/slides/slide15.xml><?xml version="1.0" encoding="utf-8"?>
-<p:sld xmlns:a="http://schemas.openxmlformats.org/drawingml/2006/main" xmlns:r="http://schemas.openxmlformats.org/officeDocument/2006/relationships" xmlns:p="http://schemas.openxmlformats.org/presentationml/2006/main">
-  <p:cSld>
-    <p:spTree>
-      <p:nvGrpSpPr>
-        <p:cNvPr id="1" name=""/>
-        <p:cNvGrpSpPr/>
-        <p:nvPr/>
-      </p:nvGrpSpPr>
-      <p:grpSpPr>
-        <a:xfrm>
-          <a:off x="0" y="0"/>
-          <a:ext cx="0" cy="0"/>
-          <a:chOff x="0" y="0"/>
-          <a:chExt cx="0" cy="0"/>
-        </a:xfrm>
-      </p:grpSpPr>
-      <p:sp>
-        <p:nvSpPr>
-          <p:cNvPr id="2" name="标题 1"/>
-          <p:cNvSpPr>
-            <a:spLocks noGrp="1"/>
-          </p:cNvSpPr>
-          <p:nvPr>
-            <p:ph type="title"/>
-          </p:nvPr>
-        </p:nvSpPr>
-        <p:spPr>
-          <a:xfrm>
-            <a:off x="628650" y="2766219"/>
-            <a:ext cx="7886700" cy="1325563"/>
-          </a:xfrm>
-        </p:spPr>
-        <p:txBody>
-          <a:bodyPr/>
-          <a:lstStyle/>
-          <a:p>
-            <a:pPr algn="ctr"/>
-            <a:r>
-              <a:rPr lang="en-US" altLang="zh-CN" dirty="0">
-                <a:latin typeface="Times New Roman" panose="02020603050405020304" pitchFamily="18" charset="0"/>
-                <a:cs typeface="Times New Roman" panose="02020603050405020304" pitchFamily="18" charset="0"/>
-              </a:rPr>
-              <a:t>Rest</a:t>
-            </a:r>
-            <a:endParaRPr lang="zh-CN" altLang="en-US" dirty="0">
-              <a:latin typeface="Times New Roman" panose="02020603050405020304" pitchFamily="18" charset="0"/>
-              <a:cs typeface="Times New Roman" panose="02020603050405020304" pitchFamily="18" charset="0"/>
-            </a:endParaRPr>
-          </a:p>
-        </p:txBody>
-      </p:sp>
-    </p:spTree>
-    <p:extLst>
-      <p:ext uri="{BB962C8B-B14F-4D97-AF65-F5344CB8AC3E}">
-        <p14:creationId xmlns:p14="http://schemas.microsoft.com/office/powerpoint/2010/main" val="470608906"/>
-      </p:ext>
-    </p:extLst>
-  </p:cSld>
-  <p:clrMapOvr>
-    <a:masterClrMapping/>
-  </p:clrMapOvr>
-</p:sld>
-</file>
-
-<file path=ppt/slides/slide16.xml><?xml version="1.0" encoding="utf-8"?>
-<p:sld xmlns:a="http://schemas.openxmlformats.org/drawingml/2006/main" xmlns:r="http://schemas.openxmlformats.org/officeDocument/2006/relationships" xmlns:p="http://schemas.openxmlformats.org/presentationml/2006/main">
-  <p:cSld>
-    <p:bg>
-      <p:bgPr>
-        <a:solidFill>
-          <a:srgbClr val="7C7468"/>
-        </a:solidFill>
-        <a:effectLst/>
-      </p:bgPr>
-    </p:bg>
-    <p:spTree>
-      <p:nvGrpSpPr>
-        <p:cNvPr id="1" name=""/>
-        <p:cNvGrpSpPr/>
-        <p:nvPr/>
-      </p:nvGrpSpPr>
-      <p:grpSpPr>
-        <a:xfrm>
-          <a:off x="0" y="0"/>
-          <a:ext cx="0" cy="0"/>
-          <a:chOff x="0" y="0"/>
-          <a:chExt cx="0" cy="0"/>
-        </a:xfrm>
-      </p:grpSpPr>
-      <p:sp>
-        <p:nvSpPr>
-          <p:cNvPr id="5" name="标题 1">
-            <a:extLst>
-              <a:ext uri="{FF2B5EF4-FFF2-40B4-BE49-F238E27FC236}">
-                <a16:creationId xmlns:a16="http://schemas.microsoft.com/office/drawing/2014/main" id="{9E7F9276-CB36-4D03-8899-4441C9E51EC0}"/>
-              </a:ext>
-            </a:extLst>
-          </p:cNvPr>
-          <p:cNvSpPr txBox="1">
-            <a:spLocks/>
-          </p:cNvSpPr>
-          <p:nvPr/>
-        </p:nvSpPr>
-        <p:spPr>
-          <a:xfrm>
-            <a:off x="1651865" y="2738991"/>
-            <a:ext cx="5840269" cy="1380017"/>
-          </a:xfrm>
-          <a:prstGeom prst="rect">
-            <a:avLst/>
-          </a:prstGeom>
-        </p:spPr>
-        <p:txBody>
-          <a:bodyPr vert="horz" lIns="68580" tIns="34290" rIns="68580" bIns="34290" rtlCol="0" anchor="b">
-            <a:noAutofit/>
-          </a:bodyPr>
-          <a:lstStyle>
-            <a:lvl1pPr algn="ctr" defTabSz="914400" rtl="0" eaLnBrk="1" latinLnBrk="0" hangingPunct="1">
-              <a:lnSpc>
-                <a:spcPct val="90000"/>
-              </a:lnSpc>
-              <a:spcBef>
-                <a:spcPct val="0"/>
-              </a:spcBef>
-              <a:buNone/>
-              <a:defRPr sz="6000" kern="1200">
-                <a:solidFill>
-                  <a:schemeClr val="tx1"/>
-                </a:solidFill>
-                <a:latin typeface="+mj-lt"/>
-                <a:ea typeface="+mj-ea"/>
-                <a:cs typeface="+mj-cs"/>
-              </a:defRPr>
-            </a:lvl1pPr>
-          </a:lstStyle>
-          <a:p>
-            <a:pPr marL="0" marR="0" lvl="0" indent="0" algn="ctr" defTabSz="914400" rtl="0" eaLnBrk="1" fontAlgn="auto" latinLnBrk="0" hangingPunct="1">
-              <a:lnSpc>
-                <a:spcPct val="120000"/>
-              </a:lnSpc>
-              <a:spcBef>
-                <a:spcPct val="0"/>
-              </a:spcBef>
-              <a:spcAft>
-                <a:spcPts val="0"/>
-              </a:spcAft>
-              <a:buClrTx/>
-              <a:buSzTx/>
-              <a:buFontTx/>
-              <a:buNone/>
-              <a:tabLst/>
-              <a:defRPr/>
-            </a:pPr>
-            <a:r>
-              <a:rPr kumimoji="0" lang="zh-CN" altLang="en-US" sz="4000" b="0" i="0" u="none" strike="noStrike" kern="1200" cap="none" spc="0" normalizeH="0" baseline="0" noProof="0" dirty="0">
-                <a:ln>
-                  <a:noFill/>
-                </a:ln>
-                <a:solidFill>
-                  <a:prstClr val="white"/>
-                </a:solidFill>
-                <a:effectLst/>
-                <a:uLnTx/>
-                <a:uFillTx/>
-                <a:latin typeface="黑体" panose="02010609060101010101" pitchFamily="49" charset="-122"/>
-                <a:ea typeface="黑体" panose="02010609060101010101" pitchFamily="49" charset="-122"/>
-                <a:cs typeface="Times New Roman" panose="02020603050405020304" pitchFamily="18" charset="0"/>
-              </a:rPr>
-              <a:t>请</a:t>
-            </a:r>
-            <a:r>
-              <a:rPr lang="zh-CN" altLang="en-US" sz="4000" dirty="0">
-                <a:solidFill>
-                  <a:prstClr val="white"/>
-                </a:solidFill>
-                <a:latin typeface="黑体" panose="02010609060101010101" pitchFamily="49" charset="-122"/>
-                <a:ea typeface="黑体" panose="02010609060101010101" pitchFamily="49" charset="-122"/>
-                <a:cs typeface="Times New Roman" panose="02020603050405020304" pitchFamily="18" charset="0"/>
-              </a:rPr>
-              <a:t>您注视中央十字，保持头不要动，平静休息</a:t>
-            </a:r>
-            <a:r>
-              <a:rPr kumimoji="0" lang="zh-CN" altLang="en-US" sz="4000" b="0" i="0" u="none" strike="noStrike" kern="1200" cap="none" spc="0" normalizeH="0" baseline="0" noProof="0" dirty="0">
-                <a:ln>
-                  <a:noFill/>
-                </a:ln>
-                <a:solidFill>
-                  <a:prstClr val="white"/>
-                </a:solidFill>
-                <a:effectLst/>
-                <a:uLnTx/>
-                <a:uFillTx/>
-                <a:latin typeface="黑体" panose="02010609060101010101" pitchFamily="49" charset="-122"/>
-                <a:ea typeface="黑体" panose="02010609060101010101" pitchFamily="49" charset="-122"/>
-                <a:cs typeface="Times New Roman" panose="02020603050405020304" pitchFamily="18" charset="0"/>
-              </a:rPr>
-              <a:t>。</a:t>
-            </a:r>
-            <a:endParaRPr kumimoji="0" lang="zh-CN" altLang="en-US" sz="4000" b="0" i="0" u="none" strike="noStrike" kern="1200" cap="none" spc="0" normalizeH="0" baseline="0" noProof="0" dirty="0">
-              <a:ln>
-                <a:noFill/>
-              </a:ln>
-              <a:solidFill>
-                <a:prstClr val="white"/>
-              </a:solidFill>
-              <a:effectLst/>
-              <a:uLnTx/>
-              <a:uFillTx/>
-              <a:latin typeface="黑体" panose="02010609060101010101" pitchFamily="49" charset="-122"/>
-              <a:ea typeface="黑体" panose="02010609060101010101" pitchFamily="49" charset="-122"/>
-              <a:cs typeface="+mj-cs"/>
-            </a:endParaRPr>
-          </a:p>
-        </p:txBody>
-      </p:sp>
-    </p:spTree>
-    <p:extLst>
-      <p:ext uri="{BB962C8B-B14F-4D97-AF65-F5344CB8AC3E}">
-        <p14:creationId xmlns:p14="http://schemas.microsoft.com/office/powerpoint/2010/main" val="3733487006"/>
-      </p:ext>
-    </p:extLst>
-  </p:cSld>
-  <p:clrMapOvr>
-    <a:masterClrMapping/>
-  </p:clrMapOvr>
-</p:sld>
-</file>
-
-<file path=ppt/slides/slide17.xml><?xml version="1.0" encoding="utf-8"?>
-<p:sld xmlns:a="http://schemas.openxmlformats.org/drawingml/2006/main" xmlns:r="http://schemas.openxmlformats.org/officeDocument/2006/relationships" xmlns:p="http://schemas.openxmlformats.org/presentationml/2006/main">
-  <p:cSld>
-    <p:bg>
-      <p:bgPr>
-        <a:solidFill>
-          <a:srgbClr val="7C7468"/>
+          <a:srgbClr val="808080"/>
         </a:solidFill>
         <a:effectLst/>
       </p:bgPr>
@@ -5265,75 +4206,10 @@
 <file path=ppt/slides/slide3.xml><?xml version="1.0" encoding="utf-8"?>
 <p:sld xmlns:a="http://schemas.openxmlformats.org/drawingml/2006/main" xmlns:r="http://schemas.openxmlformats.org/officeDocument/2006/relationships" xmlns:p="http://schemas.openxmlformats.org/presentationml/2006/main">
   <p:cSld>
-    <p:spTree>
-      <p:nvGrpSpPr>
-        <p:cNvPr id="1" name=""/>
-        <p:cNvGrpSpPr/>
-        <p:nvPr/>
-      </p:nvGrpSpPr>
-      <p:grpSpPr>
-        <a:xfrm>
-          <a:off x="0" y="0"/>
-          <a:ext cx="0" cy="0"/>
-          <a:chOff x="0" y="0"/>
-          <a:chExt cx="0" cy="0"/>
-        </a:xfrm>
-      </p:grpSpPr>
-      <p:sp>
-        <p:nvSpPr>
-          <p:cNvPr id="2" name="标题 1"/>
-          <p:cNvSpPr>
-            <a:spLocks noGrp="1"/>
-          </p:cNvSpPr>
-          <p:nvPr>
-            <p:ph type="title"/>
-          </p:nvPr>
-        </p:nvSpPr>
-        <p:spPr>
-          <a:xfrm>
-            <a:off x="628650" y="2766219"/>
-            <a:ext cx="7886700" cy="1325563"/>
-          </a:xfrm>
-        </p:spPr>
-        <p:txBody>
-          <a:bodyPr/>
-          <a:lstStyle/>
-          <a:p>
-            <a:pPr algn="ctr"/>
-            <a:r>
-              <a:rPr lang="en-US" altLang="zh-CN" dirty="0">
-                <a:latin typeface="Times New Roman" panose="02020603050405020304" pitchFamily="18" charset="0"/>
-                <a:cs typeface="Times New Roman" panose="02020603050405020304" pitchFamily="18" charset="0"/>
-              </a:rPr>
-              <a:t>Train set</a:t>
-            </a:r>
-            <a:endParaRPr lang="zh-CN" altLang="en-US" dirty="0">
-              <a:latin typeface="Times New Roman" panose="02020603050405020304" pitchFamily="18" charset="0"/>
-              <a:cs typeface="Times New Roman" panose="02020603050405020304" pitchFamily="18" charset="0"/>
-            </a:endParaRPr>
-          </a:p>
-        </p:txBody>
-      </p:sp>
-    </p:spTree>
-    <p:extLst>
-      <p:ext uri="{BB962C8B-B14F-4D97-AF65-F5344CB8AC3E}">
-        <p14:creationId xmlns:p14="http://schemas.microsoft.com/office/powerpoint/2010/main" val="1706606699"/>
-      </p:ext>
-    </p:extLst>
-  </p:cSld>
-  <p:clrMapOvr>
-    <a:masterClrMapping/>
-  </p:clrMapOvr>
-</p:sld>
-</file>
-
-<file path=ppt/slides/slide4.xml><?xml version="1.0" encoding="utf-8"?>
-<p:sld xmlns:a="http://schemas.openxmlformats.org/drawingml/2006/main" xmlns:r="http://schemas.openxmlformats.org/officeDocument/2006/relationships" xmlns:p="http://schemas.openxmlformats.org/presentationml/2006/main">
-  <p:cSld>
     <p:bg>
       <p:bgPr>
         <a:solidFill>
-          <a:srgbClr val="7C7468"/>
+          <a:srgbClr val="808080"/>
         </a:solidFill>
         <a:effectLst/>
       </p:bgPr>
@@ -5394,7 +4270,7 @@
                 <a:ea typeface="黑体" panose="02010609060101010101" pitchFamily="49" charset="-122"/>
                 <a:cs typeface="Times New Roman" panose="02020603050405020304" pitchFamily="18" charset="0"/>
               </a:rPr>
-              <a:t>实验中请时刻注视屏幕中央圆点，并判断图片中的物体是否有生命，在每张图片消失后尽快按键反应。</a:t>
+              <a:t>实验中请时刻注视屏幕中央圆点，并判断视频中动作的适合参与人数，在每个视频消失后尽快按键反应。</a:t>
             </a:r>
             <a:endParaRPr lang="en-US" altLang="zh-CN" sz="2800" dirty="0">
               <a:solidFill>
@@ -5420,7 +4296,7 @@
                 <a:ea typeface="黑体" panose="02010609060101010101" pitchFamily="49" charset="-122"/>
                 <a:cs typeface="Times New Roman" panose="02020603050405020304" pitchFamily="18" charset="0"/>
               </a:rPr>
-              <a:t>有生命按左键，无生命按右键。</a:t>
+              <a:t>单人按左键，多人按右键。</a:t>
             </a:r>
             <a:endParaRPr lang="en-US" altLang="zh-CN" sz="2800" dirty="0">
               <a:solidFill>
@@ -5471,13 +4347,13 @@
 </p:sld>
 </file>
 
-<file path=ppt/slides/slide5.xml><?xml version="1.0" encoding="utf-8"?>
+<file path=ppt/slides/slide4.xml><?xml version="1.0" encoding="utf-8"?>
 <p:sld xmlns:a="http://schemas.openxmlformats.org/drawingml/2006/main" xmlns:r="http://schemas.openxmlformats.org/officeDocument/2006/relationships" xmlns:p="http://schemas.openxmlformats.org/presentationml/2006/main">
   <p:cSld>
     <p:bg>
       <p:bgPr>
         <a:solidFill>
-          <a:srgbClr val="7C7468"/>
+          <a:srgbClr val="808080"/>
         </a:solidFill>
         <a:effectLst/>
       </p:bgPr>
@@ -5611,13 +4487,13 @@
 </p:sld>
 </file>
 
-<file path=ppt/slides/slide6.xml><?xml version="1.0" encoding="utf-8"?>
+<file path=ppt/slides/slide5.xml><?xml version="1.0" encoding="utf-8"?>
 <p:sld xmlns:a="http://schemas.openxmlformats.org/drawingml/2006/main" xmlns:r="http://schemas.openxmlformats.org/officeDocument/2006/relationships" xmlns:p="http://schemas.openxmlformats.org/presentationml/2006/main">
   <p:cSld>
     <p:bg>
       <p:bgPr>
         <a:solidFill>
-          <a:srgbClr val="7C7468"/>
+          <a:srgbClr val="808080"/>
         </a:solidFill>
         <a:effectLst/>
       </p:bgPr>
@@ -5728,13 +4604,13 @@
 </p:sld>
 </file>
 
-<file path=ppt/slides/slide7.xml><?xml version="1.0" encoding="utf-8"?>
+<file path=ppt/slides/slide6.xml><?xml version="1.0" encoding="utf-8"?>
 <p:sld xmlns:a="http://schemas.openxmlformats.org/drawingml/2006/main" xmlns:r="http://schemas.openxmlformats.org/officeDocument/2006/relationships" xmlns:p="http://schemas.openxmlformats.org/presentationml/2006/main">
   <p:cSld>
     <p:bg>
       <p:bgPr>
         <a:solidFill>
-          <a:srgbClr val="7C7468"/>
+          <a:srgbClr val="808080"/>
         </a:solidFill>
         <a:effectLst/>
       </p:bgPr>
@@ -5783,7 +4659,7 @@
                 <a:latin typeface="黑体" panose="02010609060101010101" pitchFamily="49" charset="-122"/>
                 <a:ea typeface="黑体" panose="02010609060101010101" pitchFamily="49" charset="-122"/>
               </a:rPr>
-              <a:t>依次类推，后续会出现一系列图片</a:t>
+              <a:t>依次类推，后续会出现一系列视频</a:t>
             </a:r>
           </a:p>
         </p:txBody>
@@ -5801,13 +4677,13 @@
 </p:sld>
 </file>
 
-<file path=ppt/slides/slide8.xml><?xml version="1.0" encoding="utf-8"?>
+<file path=ppt/slides/slide7.xml><?xml version="1.0" encoding="utf-8"?>
 <p:sld xmlns:a="http://schemas.openxmlformats.org/drawingml/2006/main" xmlns:r="http://schemas.openxmlformats.org/officeDocument/2006/relationships" xmlns:p="http://schemas.openxmlformats.org/presentationml/2006/main">
   <p:cSld>
     <p:bg>
       <p:bgPr>
         <a:solidFill>
-          <a:srgbClr val="7C7468"/>
+          <a:srgbClr val="808080"/>
         </a:solidFill>
         <a:effectLst/>
       </p:bgPr>
@@ -5907,9 +4783,17 @@
 </p:sld>
 </file>
 
-<file path=ppt/slides/slide9.xml><?xml version="1.0" encoding="utf-8"?>
+<file path=ppt/slides/slide8.xml><?xml version="1.0" encoding="utf-8"?>
 <p:sld xmlns:a="http://schemas.openxmlformats.org/drawingml/2006/main" xmlns:r="http://schemas.openxmlformats.org/officeDocument/2006/relationships" xmlns:p="http://schemas.openxmlformats.org/presentationml/2006/main">
   <p:cSld>
+    <p:bg>
+      <p:bgPr>
+        <a:solidFill>
+          <a:srgbClr val="FFFFFF"/>
+        </a:solidFill>
+        <a:effectLst/>
+      </p:bgPr>
+    </p:bg>
     <p:spTree>
       <p:nvGrpSpPr>
         <p:cNvPr id="1" name=""/>
@@ -5950,7 +4834,7 @@
                 <a:latin typeface="Times New Roman" panose="02020603050405020304" pitchFamily="18" charset="0"/>
                 <a:cs typeface="Times New Roman" panose="02020603050405020304" pitchFamily="18" charset="0"/>
               </a:rPr>
-              <a:t>Test set</a:t>
+              <a:t>Rest</a:t>
             </a:r>
             <a:endParaRPr lang="zh-CN" altLang="en-US" dirty="0">
               <a:latin typeface="Times New Roman" panose="02020603050405020304" pitchFamily="18" charset="0"/>
@@ -5962,7 +4846,171 @@
     </p:spTree>
     <p:extLst>
       <p:ext uri="{BB962C8B-B14F-4D97-AF65-F5344CB8AC3E}">
-        <p14:creationId xmlns:p14="http://schemas.microsoft.com/office/powerpoint/2010/main" val="2445096982"/>
+        <p14:creationId xmlns:p14="http://schemas.microsoft.com/office/powerpoint/2010/main" val="470608906"/>
+      </p:ext>
+    </p:extLst>
+  </p:cSld>
+  <p:clrMapOvr>
+    <a:masterClrMapping/>
+  </p:clrMapOvr>
+</p:sld>
+</file>
+
+<file path=ppt/slides/slide9.xml><?xml version="1.0" encoding="utf-8"?>
+<p:sld xmlns:a="http://schemas.openxmlformats.org/drawingml/2006/main" xmlns:r="http://schemas.openxmlformats.org/officeDocument/2006/relationships" xmlns:p="http://schemas.openxmlformats.org/presentationml/2006/main">
+  <p:cSld>
+    <p:bg>
+      <p:bgPr>
+        <a:solidFill>
+          <a:srgbClr val="808080"/>
+        </a:solidFill>
+        <a:effectLst/>
+      </p:bgPr>
+    </p:bg>
+    <p:spTree>
+      <p:nvGrpSpPr>
+        <p:cNvPr id="1" name=""/>
+        <p:cNvGrpSpPr/>
+        <p:nvPr/>
+      </p:nvGrpSpPr>
+      <p:grpSpPr>
+        <a:xfrm>
+          <a:off x="0" y="0"/>
+          <a:ext cx="0" cy="0"/>
+          <a:chOff x="0" y="0"/>
+          <a:chExt cx="0" cy="0"/>
+        </a:xfrm>
+      </p:grpSpPr>
+      <p:sp>
+        <p:nvSpPr>
+          <p:cNvPr id="5" name="标题 1">
+            <a:extLst>
+              <a:ext uri="{FF2B5EF4-FFF2-40B4-BE49-F238E27FC236}">
+                <a16:creationId xmlns:a16="http://schemas.microsoft.com/office/drawing/2014/main" id="{9E7F9276-CB36-4D03-8899-4441C9E51EC0}"/>
+              </a:ext>
+            </a:extLst>
+          </p:cNvPr>
+          <p:cNvSpPr txBox="1">
+            <a:spLocks/>
+          </p:cNvSpPr>
+          <p:nvPr/>
+        </p:nvSpPr>
+        <p:spPr>
+          <a:xfrm>
+            <a:off x="1651865" y="2738991"/>
+            <a:ext cx="5840269" cy="1380017"/>
+          </a:xfrm>
+          <a:prstGeom prst="rect">
+            <a:avLst/>
+          </a:prstGeom>
+        </p:spPr>
+        <p:txBody>
+          <a:bodyPr vert="horz" lIns="68580" tIns="34290" rIns="68580" bIns="34290" rtlCol="0" anchor="b">
+            <a:noAutofit/>
+          </a:bodyPr>
+          <a:lstStyle>
+            <a:lvl1pPr algn="ctr" defTabSz="914400" rtl="0" eaLnBrk="1" latinLnBrk="0" hangingPunct="1">
+              <a:lnSpc>
+                <a:spcPct val="90000"/>
+              </a:lnSpc>
+              <a:spcBef>
+                <a:spcPct val="0"/>
+              </a:spcBef>
+              <a:buNone/>
+              <a:defRPr sz="6000" kern="1200">
+                <a:solidFill>
+                  <a:schemeClr val="tx1"/>
+                </a:solidFill>
+                <a:latin typeface="+mj-lt"/>
+                <a:ea typeface="+mj-ea"/>
+                <a:cs typeface="+mj-cs"/>
+              </a:defRPr>
+            </a:lvl1pPr>
+          </a:lstStyle>
+          <a:p>
+            <a:pPr marL="0" marR="0" lvl="0" indent="0" algn="ctr" defTabSz="914400" rtl="0" eaLnBrk="1" fontAlgn="auto" latinLnBrk="0" hangingPunct="1">
+              <a:lnSpc>
+                <a:spcPct val="120000"/>
+              </a:lnSpc>
+              <a:spcBef>
+                <a:spcPct val="0"/>
+              </a:spcBef>
+              <a:spcAft>
+                <a:spcPts val="0"/>
+              </a:spcAft>
+              <a:buClrTx/>
+              <a:buSzTx/>
+              <a:buFontTx/>
+              <a:buNone/>
+              <a:tabLst/>
+              <a:defRPr/>
+            </a:pPr>
+            <a:r>
+              <a:rPr kumimoji="0" lang="zh-CN" altLang="en-US" sz="4000" b="0" i="0" u="none" strike="noStrike" kern="1200" cap="none" spc="0" normalizeH="0" baseline="0" noProof="0" dirty="0">
+                <a:ln>
+                  <a:noFill/>
+                </a:ln>
+                <a:solidFill>
+                  <a:prstClr val="white"/>
+                </a:solidFill>
+                <a:effectLst/>
+                <a:uLnTx/>
+                <a:uFillTx/>
+                <a:latin typeface="黑体" panose="02010609060101010101" pitchFamily="49" charset="-122"/>
+                <a:ea typeface="黑体" panose="02010609060101010101" pitchFamily="49" charset="-122"/>
+                <a:cs typeface="Times New Roman" panose="02020603050405020304" pitchFamily="18" charset="0"/>
+              </a:rPr>
+              <a:t>请</a:t>
+            </a:r>
+            <a:r>
+              <a:rPr lang="zh-CN" altLang="en-US" sz="4000" dirty="0">
+                <a:solidFill>
+                  <a:prstClr val="white"/>
+                </a:solidFill>
+                <a:latin typeface="黑体" panose="02010609060101010101" pitchFamily="49" charset="-122"/>
+                <a:ea typeface="黑体" panose="02010609060101010101" pitchFamily="49" charset="-122"/>
+                <a:cs typeface="Times New Roman" panose="02020603050405020304" pitchFamily="18" charset="0"/>
+              </a:rPr>
+              <a:t>您注视中央十字，保持头不要动，平静休息</a:t>
+            </a:r>
+            <a:r>
+              <a:rPr kumimoji="0" lang="zh-CN" altLang="en-US" sz="4000" b="0" i="0" u="none" strike="noStrike" kern="1200" cap="none" spc="0" normalizeH="0" baseline="0" noProof="0" dirty="0">
+                <a:ln>
+                  <a:noFill/>
+                </a:ln>
+                <a:solidFill>
+                  <a:prstClr val="white"/>
+                </a:solidFill>
+                <a:effectLst/>
+                <a:uLnTx/>
+                <a:uFillTx/>
+                <a:latin typeface="黑体" panose="02010609060101010101" pitchFamily="49" charset="-122"/>
+                <a:ea typeface="黑体" panose="02010609060101010101" pitchFamily="49" charset="-122"/>
+                <a:cs typeface="Times New Roman" panose="02020603050405020304" pitchFamily="18" charset="0"/>
+              </a:rPr>
+              <a:t>。</a:t>
+            </a:r>
+            <a:endParaRPr kumimoji="0" lang="zh-CN" altLang="en-US" sz="4000" b="0" i="0" u="none" strike="noStrike" kern="1200" cap="none" spc="0" normalizeH="0" baseline="0" noProof="0" dirty="0">
+              <a:ln>
+                <a:noFill/>
+              </a:ln>
+              <a:solidFill>
+                <a:prstClr val="white"/>
+              </a:solidFill>
+              <a:effectLst/>
+              <a:uLnTx/>
+              <a:uFillTx/>
+              <a:latin typeface="黑体" panose="02010609060101010101" pitchFamily="49" charset="-122"/>
+              <a:ea typeface="黑体" panose="02010609060101010101" pitchFamily="49" charset="-122"/>
+              <a:cs typeface="+mj-cs"/>
+            </a:endParaRPr>
+          </a:p>
+        </p:txBody>
+      </p:sp>
+    </p:spTree>
+    <p:extLst>
+      <p:ext uri="{BB962C8B-B14F-4D97-AF65-F5344CB8AC3E}">
+        <p14:creationId xmlns:p14="http://schemas.microsoft.com/office/powerpoint/2010/main" val="3733487006"/>
       </p:ext>
     </p:extLst>
   </p:cSld>

</xml_diff>

<commit_message>
ENH: action task changed
</commit_message>
<xml_diff>
--- a/action/instruction/instruction.pptx
+++ b/action/instruction/instruction.pptx
@@ -206,7 +206,7 @@
           <a:p>
             <a:fld id="{5E0BD2FF-DB0B-4157-9238-BCF205BF74EE}" type="datetimeFigureOut">
               <a:rPr lang="zh-CN" altLang="en-US" smtClean="0"/>
-              <a:t>2021/1/21</a:t>
+              <a:t>2021/1/24</a:t>
             </a:fld>
             <a:endParaRPr lang="zh-CN" altLang="en-US"/>
           </a:p>
@@ -1056,7 +1056,7 @@
           <a:p>
             <a:fld id="{C56612D5-36F0-430E-8993-22E7E4C9B704}" type="datetimeFigureOut">
               <a:rPr lang="zh-CN" altLang="en-US" smtClean="0"/>
-              <a:t>2021/1/21</a:t>
+              <a:t>2021/1/24</a:t>
             </a:fld>
             <a:endParaRPr lang="zh-CN" altLang="en-US"/>
           </a:p>
@@ -1226,7 +1226,7 @@
           <a:p>
             <a:fld id="{C56612D5-36F0-430E-8993-22E7E4C9B704}" type="datetimeFigureOut">
               <a:rPr lang="zh-CN" altLang="en-US" smtClean="0"/>
-              <a:t>2021/1/21</a:t>
+              <a:t>2021/1/24</a:t>
             </a:fld>
             <a:endParaRPr lang="zh-CN" altLang="en-US"/>
           </a:p>
@@ -1406,7 +1406,7 @@
           <a:p>
             <a:fld id="{C56612D5-36F0-430E-8993-22E7E4C9B704}" type="datetimeFigureOut">
               <a:rPr lang="zh-CN" altLang="en-US" smtClean="0"/>
-              <a:t>2021/1/21</a:t>
+              <a:t>2021/1/24</a:t>
             </a:fld>
             <a:endParaRPr lang="zh-CN" altLang="en-US"/>
           </a:p>
@@ -1576,7 +1576,7 @@
           <a:p>
             <a:fld id="{C56612D5-36F0-430E-8993-22E7E4C9B704}" type="datetimeFigureOut">
               <a:rPr lang="zh-CN" altLang="en-US" smtClean="0"/>
-              <a:t>2021/1/21</a:t>
+              <a:t>2021/1/24</a:t>
             </a:fld>
             <a:endParaRPr lang="zh-CN" altLang="en-US"/>
           </a:p>
@@ -1820,7 +1820,7 @@
           <a:p>
             <a:fld id="{C56612D5-36F0-430E-8993-22E7E4C9B704}" type="datetimeFigureOut">
               <a:rPr lang="zh-CN" altLang="en-US" smtClean="0"/>
-              <a:t>2021/1/21</a:t>
+              <a:t>2021/1/24</a:t>
             </a:fld>
             <a:endParaRPr lang="zh-CN" altLang="en-US"/>
           </a:p>
@@ -2052,7 +2052,7 @@
           <a:p>
             <a:fld id="{C56612D5-36F0-430E-8993-22E7E4C9B704}" type="datetimeFigureOut">
               <a:rPr lang="zh-CN" altLang="en-US" smtClean="0"/>
-              <a:t>2021/1/21</a:t>
+              <a:t>2021/1/24</a:t>
             </a:fld>
             <a:endParaRPr lang="zh-CN" altLang="en-US"/>
           </a:p>
@@ -2419,7 +2419,7 @@
           <a:p>
             <a:fld id="{C56612D5-36F0-430E-8993-22E7E4C9B704}" type="datetimeFigureOut">
               <a:rPr lang="zh-CN" altLang="en-US" smtClean="0"/>
-              <a:t>2021/1/21</a:t>
+              <a:t>2021/1/24</a:t>
             </a:fld>
             <a:endParaRPr lang="zh-CN" altLang="en-US"/>
           </a:p>
@@ -2537,7 +2537,7 @@
           <a:p>
             <a:fld id="{C56612D5-36F0-430E-8993-22E7E4C9B704}" type="datetimeFigureOut">
               <a:rPr lang="zh-CN" altLang="en-US" smtClean="0"/>
-              <a:t>2021/1/21</a:t>
+              <a:t>2021/1/24</a:t>
             </a:fld>
             <a:endParaRPr lang="zh-CN" altLang="en-US"/>
           </a:p>
@@ -2632,7 +2632,7 @@
           <a:p>
             <a:fld id="{C56612D5-36F0-430E-8993-22E7E4C9B704}" type="datetimeFigureOut">
               <a:rPr lang="zh-CN" altLang="en-US" smtClean="0"/>
-              <a:t>2021/1/21</a:t>
+              <a:t>2021/1/24</a:t>
             </a:fld>
             <a:endParaRPr lang="zh-CN" altLang="en-US"/>
           </a:p>
@@ -2909,7 +2909,7 @@
           <a:p>
             <a:fld id="{C56612D5-36F0-430E-8993-22E7E4C9B704}" type="datetimeFigureOut">
               <a:rPr lang="zh-CN" altLang="en-US" smtClean="0"/>
-              <a:t>2021/1/21</a:t>
+              <a:t>2021/1/24</a:t>
             </a:fld>
             <a:endParaRPr lang="zh-CN" altLang="en-US"/>
           </a:p>
@@ -3166,7 +3166,7 @@
           <a:p>
             <a:fld id="{C56612D5-36F0-430E-8993-22E7E4C9B704}" type="datetimeFigureOut">
               <a:rPr lang="zh-CN" altLang="en-US" smtClean="0"/>
-              <a:t>2021/1/21</a:t>
+              <a:t>2021/1/24</a:t>
             </a:fld>
             <a:endParaRPr lang="zh-CN" altLang="en-US"/>
           </a:p>
@@ -3379,7 +3379,7 @@
           <a:p>
             <a:fld id="{C56612D5-36F0-430E-8993-22E7E4C9B704}" type="datetimeFigureOut">
               <a:rPr lang="zh-CN" altLang="en-US" smtClean="0"/>
-              <a:t>2021/1/21</a:t>
+              <a:t>2021/1/24</a:t>
             </a:fld>
             <a:endParaRPr lang="zh-CN" altLang="en-US"/>
           </a:p>
@@ -4246,8 +4246,8 @@
         </p:nvSpPr>
         <p:spPr>
           <a:xfrm>
-            <a:off x="1522897" y="1881976"/>
-            <a:ext cx="6098207" cy="3094048"/>
+            <a:off x="1444621" y="1881976"/>
+            <a:ext cx="6654151" cy="3094048"/>
           </a:xfrm>
         </p:spPr>
         <p:txBody>
@@ -4270,7 +4270,7 @@
                 <a:ea typeface="黑体" panose="02010609060101010101" pitchFamily="49" charset="-122"/>
                 <a:cs typeface="Times New Roman" panose="02020603050405020304" pitchFamily="18" charset="0"/>
               </a:rPr>
-              <a:t>实验中请时刻注视屏幕中央圆点，并判断视频中动作的适合参与人数，在每个视频消失后尽快按键反应。</a:t>
+              <a:t>实验中请时刻注视屏幕中央圆点，并判断视频中动作是否为家务活动，在每个视频消失后尽快按键反应。</a:t>
             </a:r>
             <a:endParaRPr lang="en-US" altLang="zh-CN" sz="2800" dirty="0">
               <a:solidFill>
@@ -4296,7 +4296,7 @@
                 <a:ea typeface="黑体" panose="02010609060101010101" pitchFamily="49" charset="-122"/>
                 <a:cs typeface="Times New Roman" panose="02020603050405020304" pitchFamily="18" charset="0"/>
               </a:rPr>
-              <a:t>单人按左键，多人按右键。</a:t>
+              <a:t>是家务活动按左键，不是家务活动按右键。</a:t>
             </a:r>
             <a:endParaRPr lang="en-US" altLang="zh-CN" sz="2800" dirty="0">
               <a:solidFill>

</xml_diff>